<commit_message>
rebuilding site 2018年 5月24日 木曜日 20時24分14秒 JST
</commit_message>
<xml_diff>
--- a/static/img/diagram/nginx-oauth-auth0.pptx
+++ b/static/img/diagram/nginx-oauth-auth0.pptx
@@ -6,6 +6,7 @@
   </p:sldMasterIdLst>
   <p:sldIdLst>
     <p:sldId id="258" r:id="rId2"/>
+    <p:sldId id="259" r:id="rId3"/>
   </p:sldIdLst>
   <p:sldSz cx="12192000" cy="6858000"/>
   <p:notesSz cx="6858000" cy="9144000"/>
@@ -259,7 +260,7 @@
           <a:p>
             <a:fld id="{BAFA9119-9E2A-4E17-8387-BBB7DF337C0D}" type="datetimeFigureOut">
               <a:rPr kumimoji="1" lang="ja-JP" altLang="en-US" smtClean="0"/>
-              <a:t>2018/5/23</a:t>
+              <a:t>2018/5/24</a:t>
             </a:fld>
             <a:endParaRPr kumimoji="1" lang="ja-JP" altLang="en-US"/>
           </a:p>
@@ -489,7 +490,7 @@
           <a:p>
             <a:fld id="{BAFA9119-9E2A-4E17-8387-BBB7DF337C0D}" type="datetimeFigureOut">
               <a:rPr kumimoji="1" lang="ja-JP" altLang="en-US" smtClean="0"/>
-              <a:t>2018/5/23</a:t>
+              <a:t>2018/5/24</a:t>
             </a:fld>
             <a:endParaRPr kumimoji="1" lang="ja-JP" altLang="en-US"/>
           </a:p>
@@ -729,7 +730,7 @@
           <a:p>
             <a:fld id="{BAFA9119-9E2A-4E17-8387-BBB7DF337C0D}" type="datetimeFigureOut">
               <a:rPr kumimoji="1" lang="ja-JP" altLang="en-US" smtClean="0"/>
-              <a:t>2018/5/23</a:t>
+              <a:t>2018/5/24</a:t>
             </a:fld>
             <a:endParaRPr kumimoji="1" lang="ja-JP" altLang="en-US"/>
           </a:p>
@@ -959,7 +960,7 @@
           <a:p>
             <a:fld id="{BAFA9119-9E2A-4E17-8387-BBB7DF337C0D}" type="datetimeFigureOut">
               <a:rPr kumimoji="1" lang="ja-JP" altLang="en-US" smtClean="0"/>
-              <a:t>2018/5/23</a:t>
+              <a:t>2018/5/24</a:t>
             </a:fld>
             <a:endParaRPr kumimoji="1" lang="ja-JP" altLang="en-US"/>
           </a:p>
@@ -1234,7 +1235,7 @@
           <a:p>
             <a:fld id="{BAFA9119-9E2A-4E17-8387-BBB7DF337C0D}" type="datetimeFigureOut">
               <a:rPr kumimoji="1" lang="ja-JP" altLang="en-US" smtClean="0"/>
-              <a:t>2018/5/23</a:t>
+              <a:t>2018/5/24</a:t>
             </a:fld>
             <a:endParaRPr kumimoji="1" lang="ja-JP" altLang="en-US"/>
           </a:p>
@@ -1563,7 +1564,7 @@
           <a:p>
             <a:fld id="{BAFA9119-9E2A-4E17-8387-BBB7DF337C0D}" type="datetimeFigureOut">
               <a:rPr kumimoji="1" lang="ja-JP" altLang="en-US" smtClean="0"/>
-              <a:t>2018/5/23</a:t>
+              <a:t>2018/5/24</a:t>
             </a:fld>
             <a:endParaRPr kumimoji="1" lang="ja-JP" altLang="en-US"/>
           </a:p>
@@ -2039,7 +2040,7 @@
           <a:p>
             <a:fld id="{BAFA9119-9E2A-4E17-8387-BBB7DF337C0D}" type="datetimeFigureOut">
               <a:rPr kumimoji="1" lang="ja-JP" altLang="en-US" smtClean="0"/>
-              <a:t>2018/5/23</a:t>
+              <a:t>2018/5/24</a:t>
             </a:fld>
             <a:endParaRPr kumimoji="1" lang="ja-JP" altLang="en-US"/>
           </a:p>
@@ -2180,7 +2181,7 @@
           <a:p>
             <a:fld id="{BAFA9119-9E2A-4E17-8387-BBB7DF337C0D}" type="datetimeFigureOut">
               <a:rPr kumimoji="1" lang="ja-JP" altLang="en-US" smtClean="0"/>
-              <a:t>2018/5/23</a:t>
+              <a:t>2018/5/24</a:t>
             </a:fld>
             <a:endParaRPr kumimoji="1" lang="ja-JP" altLang="en-US"/>
           </a:p>
@@ -2293,7 +2294,7 @@
           <a:p>
             <a:fld id="{BAFA9119-9E2A-4E17-8387-BBB7DF337C0D}" type="datetimeFigureOut">
               <a:rPr kumimoji="1" lang="ja-JP" altLang="en-US" smtClean="0"/>
-              <a:t>2018/5/23</a:t>
+              <a:t>2018/5/24</a:t>
             </a:fld>
             <a:endParaRPr kumimoji="1" lang="ja-JP" altLang="en-US"/>
           </a:p>
@@ -2636,7 +2637,7 @@
           <a:p>
             <a:fld id="{BAFA9119-9E2A-4E17-8387-BBB7DF337C0D}" type="datetimeFigureOut">
               <a:rPr kumimoji="1" lang="ja-JP" altLang="en-US" smtClean="0"/>
-              <a:t>2018/5/23</a:t>
+              <a:t>2018/5/24</a:t>
             </a:fld>
             <a:endParaRPr kumimoji="1" lang="ja-JP" altLang="en-US"/>
           </a:p>
@@ -2924,7 +2925,7 @@
           <a:p>
             <a:fld id="{BAFA9119-9E2A-4E17-8387-BBB7DF337C0D}" type="datetimeFigureOut">
               <a:rPr kumimoji="1" lang="ja-JP" altLang="en-US" smtClean="0"/>
-              <a:t>2018/5/23</a:t>
+              <a:t>2018/5/24</a:t>
             </a:fld>
             <a:endParaRPr kumimoji="1" lang="ja-JP" altLang="en-US"/>
           </a:p>
@@ -3197,7 +3198,7 @@
           <a:p>
             <a:fld id="{BAFA9119-9E2A-4E17-8387-BBB7DF337C0D}" type="datetimeFigureOut">
               <a:rPr kumimoji="1" lang="ja-JP" altLang="en-US" smtClean="0"/>
-              <a:t>2018/5/23</a:t>
+              <a:t>2018/5/24</a:t>
             </a:fld>
             <a:endParaRPr kumimoji="1" lang="ja-JP" altLang="en-US"/>
           </a:p>
@@ -3889,7 +3890,7 @@
         </p:blipFill>
         <p:spPr>
           <a:xfrm>
-            <a:off x="8219183" y="794507"/>
+            <a:off x="8214724" y="1383564"/>
             <a:ext cx="2850866" cy="4453033"/>
           </a:xfrm>
           <a:prstGeom prst="rect">
@@ -4193,10 +4194,225 @@
           </a:p>
         </p:txBody>
       </p:sp>
+      <p:pic>
+        <p:nvPicPr>
+          <p:cNvPr id="4" name="図 3">
+            <a:extLst>
+              <a:ext uri="{FF2B5EF4-FFF2-40B4-BE49-F238E27FC236}">
+                <a16:creationId xmlns:a16="http://schemas.microsoft.com/office/drawing/2014/main" id="{6E0CEE38-BF1F-AF48-A29A-7D3597971CB0}"/>
+              </a:ext>
+            </a:extLst>
+          </p:cNvPr>
+          <p:cNvPicPr>
+            <a:picLocks noChangeAspect="1"/>
+          </p:cNvPicPr>
+          <p:nvPr/>
+        </p:nvPicPr>
+        <p:blipFill>
+          <a:blip r:embed="rId5"/>
+          <a:stretch>
+            <a:fillRect/>
+          </a:stretch>
+        </p:blipFill>
+        <p:spPr>
+          <a:xfrm>
+            <a:off x="9139833" y="424164"/>
+            <a:ext cx="1925757" cy="404409"/>
+          </a:xfrm>
+          <a:prstGeom prst="rect">
+            <a:avLst/>
+          </a:prstGeom>
+        </p:spPr>
+      </p:pic>
+      <p:pic>
+        <p:nvPicPr>
+          <p:cNvPr id="21" name="図 20">
+            <a:extLst>
+              <a:ext uri="{FF2B5EF4-FFF2-40B4-BE49-F238E27FC236}">
+                <a16:creationId xmlns:a16="http://schemas.microsoft.com/office/drawing/2014/main" id="{DF4C33A4-FCB9-D14A-9C59-38ACBA1CF7A1}"/>
+              </a:ext>
+            </a:extLst>
+          </p:cNvPr>
+          <p:cNvPicPr>
+            <a:picLocks noChangeAspect="1"/>
+          </p:cNvPicPr>
+          <p:nvPr/>
+        </p:nvPicPr>
+        <p:blipFill>
+          <a:blip r:embed="rId3">
+            <a:extLst>
+              <a:ext uri="{28A0092B-C50C-407E-A947-70E740481C1C}">
+                <a14:useLocalDpi xmlns:a14="http://schemas.microsoft.com/office/drawing/2010/main" val="0"/>
+              </a:ext>
+            </a:extLst>
+          </a:blip>
+          <a:stretch>
+            <a:fillRect/>
+          </a:stretch>
+        </p:blipFill>
+        <p:spPr>
+          <a:xfrm>
+            <a:off x="8297851" y="494201"/>
+            <a:ext cx="731717" cy="264333"/>
+          </a:xfrm>
+          <a:prstGeom prst="rect">
+            <a:avLst/>
+          </a:prstGeom>
+        </p:spPr>
+      </p:pic>
+      <p:sp>
+        <p:nvSpPr>
+          <p:cNvPr id="22" name="テキスト ボックス 21">
+            <a:extLst>
+              <a:ext uri="{FF2B5EF4-FFF2-40B4-BE49-F238E27FC236}">
+                <a16:creationId xmlns:a16="http://schemas.microsoft.com/office/drawing/2014/main" id="{F3A80F9E-D88B-B848-89AF-B622F27DB59E}"/>
+              </a:ext>
+            </a:extLst>
+          </p:cNvPr>
+          <p:cNvSpPr txBox="1"/>
+          <p:nvPr/>
+        </p:nvSpPr>
+        <p:spPr>
+          <a:xfrm>
+            <a:off x="9163103" y="921402"/>
+            <a:ext cx="954108" cy="369332"/>
+          </a:xfrm>
+          <a:prstGeom prst="rect">
+            <a:avLst/>
+          </a:prstGeom>
+          <a:noFill/>
+        </p:spPr>
+        <p:txBody>
+          <a:bodyPr wrap="none" rtlCol="0">
+            <a:spAutoFit/>
+          </a:bodyPr>
+          <a:lstStyle/>
+          <a:p>
+            <a:pPr algn="ctr"/>
+            <a:r>
+              <a:rPr lang="en-US" altLang="ja-JP" b="1" dirty="0">
+                <a:latin typeface="Century Gothic" panose="020B0502020202020204" pitchFamily="34" charset="0"/>
+              </a:rPr>
+              <a:t>a</a:t>
+            </a:r>
+            <a:r>
+              <a:rPr kumimoji="1" lang="en-US" altLang="ja-JP" b="1" dirty="0">
+                <a:latin typeface="Century Gothic" panose="020B0502020202020204" pitchFamily="34" charset="0"/>
+              </a:rPr>
+              <a:t>nd/or</a:t>
+            </a:r>
+            <a:endParaRPr kumimoji="1" lang="ja-JP" altLang="en-US" b="1" dirty="0">
+              <a:latin typeface="Century Gothic" panose="020B0502020202020204" pitchFamily="34" charset="0"/>
+            </a:endParaRPr>
+          </a:p>
+        </p:txBody>
+      </p:sp>
     </p:spTree>
     <p:extLst>
       <p:ext uri="{BB962C8B-B14F-4D97-AF65-F5344CB8AC3E}">
         <p14:creationId xmlns:p14="http://schemas.microsoft.com/office/powerpoint/2010/main" val="916255909"/>
+      </p:ext>
+    </p:extLst>
+  </p:cSld>
+  <p:clrMapOvr>
+    <a:masterClrMapping/>
+  </p:clrMapOvr>
+</p:sld>
+</file>
+
+<file path=ppt/slides/slide2.xml><?xml version="1.0" encoding="utf-8"?>
+<p:sld xmlns:a="http://schemas.openxmlformats.org/drawingml/2006/main" xmlns:r="http://schemas.openxmlformats.org/officeDocument/2006/relationships" xmlns:p="http://schemas.openxmlformats.org/presentationml/2006/main">
+  <p:cSld>
+    <p:spTree>
+      <p:nvGrpSpPr>
+        <p:cNvPr id="1" name=""/>
+        <p:cNvGrpSpPr/>
+        <p:nvPr/>
+      </p:nvGrpSpPr>
+      <p:grpSpPr>
+        <a:xfrm>
+          <a:off x="0" y="0"/>
+          <a:ext cx="0" cy="0"/>
+          <a:chOff x="0" y="0"/>
+          <a:chExt cx="0" cy="0"/>
+        </a:xfrm>
+      </p:grpSpPr>
+      <p:pic>
+        <p:nvPicPr>
+          <p:cNvPr id="5" name="図 4">
+            <a:extLst>
+              <a:ext uri="{FF2B5EF4-FFF2-40B4-BE49-F238E27FC236}">
+                <a16:creationId xmlns:a16="http://schemas.microsoft.com/office/drawing/2014/main" id="{15206A95-4412-F34C-9089-01BA00D43360}"/>
+              </a:ext>
+            </a:extLst>
+          </p:cNvPr>
+          <p:cNvPicPr>
+            <a:picLocks noChangeAspect="1"/>
+          </p:cNvPicPr>
+          <p:nvPr/>
+        </p:nvPicPr>
+        <p:blipFill>
+          <a:blip r:embed="rId2">
+            <a:extLst>
+              <a:ext uri="{28A0092B-C50C-407E-A947-70E740481C1C}">
+                <a14:useLocalDpi xmlns:a14="http://schemas.microsoft.com/office/drawing/2010/main" val="0"/>
+              </a:ext>
+            </a:extLst>
+          </a:blip>
+          <a:stretch>
+            <a:fillRect/>
+          </a:stretch>
+        </p:blipFill>
+        <p:spPr>
+          <a:xfrm>
+            <a:off x="6523183" y="1237673"/>
+            <a:ext cx="2870199" cy="2427369"/>
+          </a:xfrm>
+          <a:prstGeom prst="rect">
+            <a:avLst/>
+          </a:prstGeom>
+        </p:spPr>
+      </p:pic>
+      <p:pic>
+        <p:nvPicPr>
+          <p:cNvPr id="7" name="図 6">
+            <a:extLst>
+              <a:ext uri="{FF2B5EF4-FFF2-40B4-BE49-F238E27FC236}">
+                <a16:creationId xmlns:a16="http://schemas.microsoft.com/office/drawing/2014/main" id="{84790748-4B7A-FA48-A660-5E28D5F4B5A5}"/>
+              </a:ext>
+            </a:extLst>
+          </p:cNvPr>
+          <p:cNvPicPr>
+            <a:picLocks noChangeAspect="1"/>
+          </p:cNvPicPr>
+          <p:nvPr/>
+        </p:nvPicPr>
+        <p:blipFill>
+          <a:blip r:embed="rId3">
+            <a:extLst>
+              <a:ext uri="{28A0092B-C50C-407E-A947-70E740481C1C}">
+                <a14:useLocalDpi xmlns:a14="http://schemas.microsoft.com/office/drawing/2010/main" val="0"/>
+              </a:ext>
+            </a:extLst>
+          </a:blip>
+          <a:stretch>
+            <a:fillRect/>
+          </a:stretch>
+        </p:blipFill>
+        <p:spPr>
+          <a:xfrm>
+            <a:off x="3269672" y="770081"/>
+            <a:ext cx="2973200" cy="3542146"/>
+          </a:xfrm>
+          <a:prstGeom prst="rect">
+            <a:avLst/>
+          </a:prstGeom>
+        </p:spPr>
+      </p:pic>
+    </p:spTree>
+    <p:extLst>
+      <p:ext uri="{BB962C8B-B14F-4D97-AF65-F5344CB8AC3E}">
+        <p14:creationId xmlns:p14="http://schemas.microsoft.com/office/powerpoint/2010/main" val="698659857"/>
       </p:ext>
     </p:extLst>
   </p:cSld>

</xml_diff>